<commit_message>
Office theme added. Some more words in the README.
</commit_message>
<xml_diff>
--- a/powerpoint/FCTNOVA_Presentation.pptx
+++ b/powerpoint/FCTNOVA_Presentation.pptx
@@ -112,6 +112,14 @@
       </a:defRPr>
     </a:lvl9pPr>
   </p:defaultTextStyle>
+  <p:extLst>
+    <p:ext uri="{EFAFB233-063F-42B5-8137-9DF3F51BA10A}">
+      <p15:sldGuideLst xmlns:p15="http://schemas.microsoft.com/office/powerpoint/2012/main"/>
+    </p:ext>
+    <p:ext uri="{2D200454-40CA-4A62-9FC3-DE9A4176ACB9}">
+      <p15:notesGuideLst xmlns:p15="http://schemas.microsoft.com/office/powerpoint/2012/main"/>
+    </p:ext>
+  </p:extLst>
 </p:presentation>
 </file>
 
@@ -197,7 +205,7 @@
           <a:p>
             <a:fld id="{E6756E88-C245-1242-AD8C-AA2D92D63319}" type="datetimeFigureOut">
               <a:rPr lang="en-US" smtClean="0"/>
-              <a:t>2/27/17</a:t>
+              <a:t>8/2/17</a:t>
             </a:fld>
             <a:endParaRPr lang="en-US"/>
           </a:p>
@@ -362,7 +370,7 @@
           <a:p>
             <a:fld id="{4FE3D4BC-B2E4-B14D-89B9-BFF3B9DE56B5}" type="datetimeFigureOut">
               <a:rPr lang="en-US" smtClean="0"/>
-              <a:t>2/27/17</a:t>
+              <a:t>8/2/17</a:t>
             </a:fld>
             <a:endParaRPr lang="en-US"/>
           </a:p>
@@ -628,6 +636,90 @@
     </a:lvl9pPr>
   </p:notesStyle>
 </p:notesMaster>
+</file>
+
+<file path=ppt/notesSlides/notesSlide1.xml><?xml version="1.0" encoding="utf-8"?>
+<p:notes xmlns:a="http://schemas.openxmlformats.org/drawingml/2006/main" xmlns:r="http://schemas.openxmlformats.org/officeDocument/2006/relationships" xmlns:p="http://schemas.openxmlformats.org/presentationml/2006/main">
+  <p:cSld>
+    <p:spTree>
+      <p:nvGrpSpPr>
+        <p:cNvPr id="1" name=""/>
+        <p:cNvGrpSpPr/>
+        <p:nvPr/>
+      </p:nvGrpSpPr>
+      <p:grpSpPr>
+        <a:xfrm>
+          <a:off x="0" y="0"/>
+          <a:ext cx="0" cy="0"/>
+          <a:chOff x="0" y="0"/>
+          <a:chExt cx="0" cy="0"/>
+        </a:xfrm>
+      </p:grpSpPr>
+      <p:sp>
+        <p:nvSpPr>
+          <p:cNvPr id="2" name="Slide Image Placeholder 1"/>
+          <p:cNvSpPr>
+            <a:spLocks noGrp="1" noRot="1" noChangeAspect="1"/>
+          </p:cNvSpPr>
+          <p:nvPr>
+            <p:ph type="sldImg"/>
+          </p:nvPr>
+        </p:nvSpPr>
+        <p:spPr/>
+      </p:sp>
+      <p:sp>
+        <p:nvSpPr>
+          <p:cNvPr id="3" name="Notes Placeholder 2"/>
+          <p:cNvSpPr>
+            <a:spLocks noGrp="1"/>
+          </p:cNvSpPr>
+          <p:nvPr>
+            <p:ph type="body" idx="1"/>
+          </p:nvPr>
+        </p:nvSpPr>
+        <p:spPr/>
+        <p:txBody>
+          <a:bodyPr/>
+          <a:lstStyle/>
+          <a:p>
+            <a:endParaRPr lang="en-US"/>
+          </a:p>
+        </p:txBody>
+      </p:sp>
+      <p:sp>
+        <p:nvSpPr>
+          <p:cNvPr id="4" name="Slide Number Placeholder 3"/>
+          <p:cNvSpPr>
+            <a:spLocks noGrp="1"/>
+          </p:cNvSpPr>
+          <p:nvPr>
+            <p:ph type="sldNum" sz="quarter" idx="10"/>
+          </p:nvPr>
+        </p:nvSpPr>
+        <p:spPr/>
+        <p:txBody>
+          <a:bodyPr/>
+          <a:lstStyle/>
+          <a:p>
+            <a:fld id="{5C4BCAF2-D216-1346-9613-56F074882D48}" type="slidenum">
+              <a:rPr lang="en-US" smtClean="0"/>
+              <a:t>1</a:t>
+            </a:fld>
+            <a:endParaRPr lang="en-US"/>
+          </a:p>
+        </p:txBody>
+      </p:sp>
+    </p:spTree>
+    <p:extLst>
+      <p:ext uri="{BB962C8B-B14F-4D97-AF65-F5344CB8AC3E}">
+        <p14:creationId xmlns:p14="http://schemas.microsoft.com/office/powerpoint/2010/main" val="2123492978"/>
+      </p:ext>
+    </p:extLst>
+  </p:cSld>
+  <p:clrMapOvr>
+    <a:masterClrMapping/>
+  </p:clrMapOvr>
+</p:notes>
 </file>
 
 <file path=ppt/slideLayouts/slideLayout1.xml><?xml version="1.0" encoding="utf-8"?>
@@ -1273,198 +1365,6 @@
 </file>
 
 <file path=ppt/slideLayouts/slideLayout2.xml><?xml version="1.0" encoding="utf-8"?>
-<p:sldLayout xmlns:a="http://schemas.openxmlformats.org/drawingml/2006/main" xmlns:r="http://schemas.openxmlformats.org/officeDocument/2006/relationships" xmlns:p="http://schemas.openxmlformats.org/presentationml/2006/main" type="obj" preserve="1">
-  <p:cSld name="Title and Content">
-    <p:spTree>
-      <p:nvGrpSpPr>
-        <p:cNvPr id="1" name=""/>
-        <p:cNvGrpSpPr/>
-        <p:nvPr/>
-      </p:nvGrpSpPr>
-      <p:grpSpPr>
-        <a:xfrm>
-          <a:off x="0" y="0"/>
-          <a:ext cx="0" cy="0"/>
-          <a:chOff x="0" y="0"/>
-          <a:chExt cx="0" cy="0"/>
-        </a:xfrm>
-      </p:grpSpPr>
-      <p:sp>
-        <p:nvSpPr>
-          <p:cNvPr id="2" name="Title 1"/>
-          <p:cNvSpPr>
-            <a:spLocks noGrp="1"/>
-          </p:cNvSpPr>
-          <p:nvPr>
-            <p:ph type="title"/>
-          </p:nvPr>
-        </p:nvSpPr>
-        <p:spPr/>
-        <p:txBody>
-          <a:bodyPr/>
-          <a:lstStyle/>
-          <a:p>
-            <a:r>
-              <a:rPr lang="en-US" smtClean="0"/>
-              <a:t>Click to edit Master title style</a:t>
-            </a:r>
-            <a:endParaRPr lang="en-US" dirty="0"/>
-          </a:p>
-        </p:txBody>
-      </p:sp>
-      <p:sp>
-        <p:nvSpPr>
-          <p:cNvPr id="3" name="Content Placeholder 2"/>
-          <p:cNvSpPr>
-            <a:spLocks noGrp="1"/>
-          </p:cNvSpPr>
-          <p:nvPr>
-            <p:ph idx="1"/>
-          </p:nvPr>
-        </p:nvSpPr>
-        <p:spPr/>
-        <p:txBody>
-          <a:bodyPr/>
-          <a:lstStyle/>
-          <a:p>
-            <a:pPr lvl="0"/>
-            <a:r>
-              <a:rPr lang="en-US" smtClean="0"/>
-              <a:t>Click to edit Master text styles</a:t>
-            </a:r>
-          </a:p>
-          <a:p>
-            <a:pPr lvl="1"/>
-            <a:r>
-              <a:rPr lang="en-US" smtClean="0"/>
-              <a:t>Second level</a:t>
-            </a:r>
-          </a:p>
-          <a:p>
-            <a:pPr lvl="2"/>
-            <a:r>
-              <a:rPr lang="en-US" smtClean="0"/>
-              <a:t>Third level</a:t>
-            </a:r>
-          </a:p>
-          <a:p>
-            <a:pPr lvl="3"/>
-            <a:r>
-              <a:rPr lang="en-US" smtClean="0"/>
-              <a:t>Fourth level</a:t>
-            </a:r>
-          </a:p>
-          <a:p>
-            <a:pPr lvl="4"/>
-            <a:r>
-              <a:rPr lang="en-US" smtClean="0"/>
-              <a:t>Fifth level</a:t>
-            </a:r>
-            <a:endParaRPr lang="en-US" dirty="0"/>
-          </a:p>
-        </p:txBody>
-      </p:sp>
-      <p:sp>
-        <p:nvSpPr>
-          <p:cNvPr id="4" name="Date Placeholder 3"/>
-          <p:cNvSpPr>
-            <a:spLocks noGrp="1"/>
-          </p:cNvSpPr>
-          <p:nvPr>
-            <p:ph type="dt" sz="half" idx="10"/>
-          </p:nvPr>
-        </p:nvSpPr>
-        <p:spPr>
-          <a:xfrm>
-            <a:off x="6815690" y="6558128"/>
-            <a:ext cx="2057400" cy="365125"/>
-          </a:xfrm>
-          <a:prstGeom prst="rect">
-            <a:avLst/>
-          </a:prstGeom>
-        </p:spPr>
-        <p:txBody>
-          <a:bodyPr/>
-          <a:lstStyle/>
-          <a:p>
-            <a:fld id="{1D0D4A2B-BFEE-FA4F-8A56-32A2EE6A0425}" type="datetime3">
-              <a:rPr lang="en-US" smtClean="0"/>
-              <a:t>27 February 2017</a:t>
-            </a:fld>
-            <a:endParaRPr lang="en-US"/>
-          </a:p>
-        </p:txBody>
-      </p:sp>
-      <p:sp>
-        <p:nvSpPr>
-          <p:cNvPr id="5" name="Footer Placeholder 4"/>
-          <p:cNvSpPr>
-            <a:spLocks noGrp="1"/>
-          </p:cNvSpPr>
-          <p:nvPr>
-            <p:ph type="ftr" sz="quarter" idx="11"/>
-          </p:nvPr>
-        </p:nvSpPr>
-        <p:spPr/>
-        <p:txBody>
-          <a:bodyPr/>
-          <a:lstStyle>
-            <a:lvl1pPr>
-              <a:defRPr>
-                <a:solidFill>
-                  <a:schemeClr val="bg1"/>
-                </a:solidFill>
-              </a:defRPr>
-            </a:lvl1pPr>
-          </a:lstStyle>
-          <a:p>
-            <a:r>
-              <a:rPr lang="en-US" smtClean="0"/>
-              <a:t>Preparação De Dissertação</a:t>
-            </a:r>
-            <a:endParaRPr lang="en-US" dirty="0"/>
-          </a:p>
-        </p:txBody>
-      </p:sp>
-      <p:sp>
-        <p:nvSpPr>
-          <p:cNvPr id="6" name="Slide Number Placeholder 5"/>
-          <p:cNvSpPr>
-            <a:spLocks noGrp="1"/>
-          </p:cNvSpPr>
-          <p:nvPr>
-            <p:ph type="sldNum" sz="quarter" idx="12"/>
-          </p:nvPr>
-        </p:nvSpPr>
-        <p:spPr/>
-        <p:txBody>
-          <a:bodyPr/>
-          <a:lstStyle/>
-          <a:p>
-            <a:fld id="{F24FE0FE-E161-124B-8234-57FCE93587AB}" type="slidenum">
-              <a:rPr lang="en-US" smtClean="0"/>
-              <a:t>‹#›</a:t>
-            </a:fld>
-            <a:endParaRPr lang="en-US"/>
-          </a:p>
-        </p:txBody>
-      </p:sp>
-    </p:spTree>
-  </p:cSld>
-  <p:clrMapOvr>
-    <a:masterClrMapping/>
-  </p:clrMapOvr>
-  <p:timing>
-    <p:tnLst>
-      <p:par>
-        <p:cTn id="1" dur="indefinite" restart="never" nodeType="tmRoot"/>
-      </p:par>
-    </p:tnLst>
-  </p:timing>
-</p:sldLayout>
-</file>
-
-<file path=ppt/slideLayouts/slideLayout3.xml><?xml version="1.0" encoding="utf-8"?>
 <p:sldLayout xmlns:a="http://schemas.openxmlformats.org/drawingml/2006/main" xmlns:r="http://schemas.openxmlformats.org/officeDocument/2006/relationships" xmlns:p="http://schemas.openxmlformats.org/presentationml/2006/main" showMasterSp="0" type="secHead" preserve="1">
   <p:cSld name="Section Header">
     <p:spTree>
@@ -1812,7 +1712,7 @@
           <a:p>
             <a:fld id="{70C82A6D-2FA5-2E47-8CA2-42CD40B030FB}" type="datetime3">
               <a:rPr lang="en-US" smtClean="0"/>
-              <a:t>27 February 2017</a:t>
+              <a:t>2 August 2017</a:t>
             </a:fld>
             <a:endParaRPr lang="en-US" dirty="0"/>
           </a:p>
@@ -2120,6 +2020,198 @@
 </p:sldLayout>
 </file>
 
+<file path=ppt/slideLayouts/slideLayout3.xml><?xml version="1.0" encoding="utf-8"?>
+<p:sldLayout xmlns:a="http://schemas.openxmlformats.org/drawingml/2006/main" xmlns:r="http://schemas.openxmlformats.org/officeDocument/2006/relationships" xmlns:p="http://schemas.openxmlformats.org/presentationml/2006/main" type="obj" preserve="1">
+  <p:cSld name="Title and Content">
+    <p:spTree>
+      <p:nvGrpSpPr>
+        <p:cNvPr id="1" name=""/>
+        <p:cNvGrpSpPr/>
+        <p:nvPr/>
+      </p:nvGrpSpPr>
+      <p:grpSpPr>
+        <a:xfrm>
+          <a:off x="0" y="0"/>
+          <a:ext cx="0" cy="0"/>
+          <a:chOff x="0" y="0"/>
+          <a:chExt cx="0" cy="0"/>
+        </a:xfrm>
+      </p:grpSpPr>
+      <p:sp>
+        <p:nvSpPr>
+          <p:cNvPr id="2" name="Title 1"/>
+          <p:cNvSpPr>
+            <a:spLocks noGrp="1"/>
+          </p:cNvSpPr>
+          <p:nvPr>
+            <p:ph type="title"/>
+          </p:nvPr>
+        </p:nvSpPr>
+        <p:spPr/>
+        <p:txBody>
+          <a:bodyPr/>
+          <a:lstStyle/>
+          <a:p>
+            <a:r>
+              <a:rPr lang="en-US" smtClean="0"/>
+              <a:t>Click to edit Master title style</a:t>
+            </a:r>
+            <a:endParaRPr lang="en-US" dirty="0"/>
+          </a:p>
+        </p:txBody>
+      </p:sp>
+      <p:sp>
+        <p:nvSpPr>
+          <p:cNvPr id="3" name="Content Placeholder 2"/>
+          <p:cNvSpPr>
+            <a:spLocks noGrp="1"/>
+          </p:cNvSpPr>
+          <p:nvPr>
+            <p:ph idx="1"/>
+          </p:nvPr>
+        </p:nvSpPr>
+        <p:spPr/>
+        <p:txBody>
+          <a:bodyPr/>
+          <a:lstStyle/>
+          <a:p>
+            <a:pPr lvl="0"/>
+            <a:r>
+              <a:rPr lang="en-US" smtClean="0"/>
+              <a:t>Click to edit Master text styles</a:t>
+            </a:r>
+          </a:p>
+          <a:p>
+            <a:pPr lvl="1"/>
+            <a:r>
+              <a:rPr lang="en-US" smtClean="0"/>
+              <a:t>Second level</a:t>
+            </a:r>
+          </a:p>
+          <a:p>
+            <a:pPr lvl="2"/>
+            <a:r>
+              <a:rPr lang="en-US" smtClean="0"/>
+              <a:t>Third level</a:t>
+            </a:r>
+          </a:p>
+          <a:p>
+            <a:pPr lvl="3"/>
+            <a:r>
+              <a:rPr lang="en-US" smtClean="0"/>
+              <a:t>Fourth level</a:t>
+            </a:r>
+          </a:p>
+          <a:p>
+            <a:pPr lvl="4"/>
+            <a:r>
+              <a:rPr lang="en-US" smtClean="0"/>
+              <a:t>Fifth level</a:t>
+            </a:r>
+            <a:endParaRPr lang="en-US" dirty="0"/>
+          </a:p>
+        </p:txBody>
+      </p:sp>
+      <p:sp>
+        <p:nvSpPr>
+          <p:cNvPr id="4" name="Date Placeholder 3"/>
+          <p:cNvSpPr>
+            <a:spLocks noGrp="1"/>
+          </p:cNvSpPr>
+          <p:nvPr>
+            <p:ph type="dt" sz="half" idx="10"/>
+          </p:nvPr>
+        </p:nvSpPr>
+        <p:spPr>
+          <a:xfrm>
+            <a:off x="6815690" y="6558128"/>
+            <a:ext cx="2057400" cy="365125"/>
+          </a:xfrm>
+          <a:prstGeom prst="rect">
+            <a:avLst/>
+          </a:prstGeom>
+        </p:spPr>
+        <p:txBody>
+          <a:bodyPr/>
+          <a:lstStyle/>
+          <a:p>
+            <a:fld id="{1D0D4A2B-BFEE-FA4F-8A56-32A2EE6A0425}" type="datetime3">
+              <a:rPr lang="en-US" smtClean="0"/>
+              <a:t>2 August 2017</a:t>
+            </a:fld>
+            <a:endParaRPr lang="en-US"/>
+          </a:p>
+        </p:txBody>
+      </p:sp>
+      <p:sp>
+        <p:nvSpPr>
+          <p:cNvPr id="5" name="Footer Placeholder 4"/>
+          <p:cNvSpPr>
+            <a:spLocks noGrp="1"/>
+          </p:cNvSpPr>
+          <p:nvPr>
+            <p:ph type="ftr" sz="quarter" idx="11"/>
+          </p:nvPr>
+        </p:nvSpPr>
+        <p:spPr/>
+        <p:txBody>
+          <a:bodyPr/>
+          <a:lstStyle>
+            <a:lvl1pPr>
+              <a:defRPr>
+                <a:solidFill>
+                  <a:schemeClr val="bg1"/>
+                </a:solidFill>
+              </a:defRPr>
+            </a:lvl1pPr>
+          </a:lstStyle>
+          <a:p>
+            <a:r>
+              <a:rPr lang="en-US" smtClean="0"/>
+              <a:t>Preparação De Dissertação</a:t>
+            </a:r>
+            <a:endParaRPr lang="en-US" dirty="0"/>
+          </a:p>
+        </p:txBody>
+      </p:sp>
+      <p:sp>
+        <p:nvSpPr>
+          <p:cNvPr id="6" name="Slide Number Placeholder 5"/>
+          <p:cNvSpPr>
+            <a:spLocks noGrp="1"/>
+          </p:cNvSpPr>
+          <p:nvPr>
+            <p:ph type="sldNum" sz="quarter" idx="12"/>
+          </p:nvPr>
+        </p:nvSpPr>
+        <p:spPr/>
+        <p:txBody>
+          <a:bodyPr/>
+          <a:lstStyle/>
+          <a:p>
+            <a:fld id="{F24FE0FE-E161-124B-8234-57FCE93587AB}" type="slidenum">
+              <a:rPr lang="en-US" smtClean="0"/>
+              <a:t>‹#›</a:t>
+            </a:fld>
+            <a:endParaRPr lang="en-US"/>
+          </a:p>
+        </p:txBody>
+      </p:sp>
+    </p:spTree>
+  </p:cSld>
+  <p:clrMapOvr>
+    <a:masterClrMapping/>
+  </p:clrMapOvr>
+  <p:timing>
+    <p:tnLst>
+      <p:par>
+        <p:cTn id="1" dur="indefinite" restart="never" nodeType="tmRoot"/>
+      </p:par>
+    </p:tnLst>
+  </p:timing>
+</p:sldLayout>
+</file>
+
 <file path=ppt/slideLayouts/slideLayout4.xml><?xml version="1.0" encoding="utf-8"?>
 <p:sldLayout xmlns:a="http://schemas.openxmlformats.org/drawingml/2006/main" xmlns:r="http://schemas.openxmlformats.org/officeDocument/2006/relationships" xmlns:p="http://schemas.openxmlformats.org/presentationml/2006/main" type="twoObj" preserve="1">
   <p:cSld name="Two Content">
@@ -2299,7 +2391,7 @@
           <a:p>
             <a:fld id="{C3FC60C3-D85C-6D47-B3D5-FBE1D80C57B4}" type="datetime3">
               <a:rPr lang="en-US" smtClean="0"/>
-              <a:t>27 February 2017</a:t>
+              <a:t>2 August 2017</a:t>
             </a:fld>
             <a:endParaRPr lang="en-US"/>
           </a:p>
@@ -2668,7 +2760,7 @@
           <a:p>
             <a:fld id="{003ACF0D-946C-3444-B12E-28314C2C0FE1}" type="datetime3">
               <a:rPr lang="en-US" smtClean="0"/>
-              <a:t>27 February 2017</a:t>
+              <a:t>2 August 2017</a:t>
             </a:fld>
             <a:endParaRPr lang="en-US"/>
           </a:p>
@@ -2839,7 +2931,7 @@
           <a:p>
             <a:fld id="{2CC4D722-DC95-794A-B3B4-75B6E54AB8B1}" type="datetime3">
               <a:rPr lang="en-US" smtClean="0"/>
-              <a:t>27 February 2017</a:t>
+              <a:t>2 August 2017</a:t>
             </a:fld>
             <a:endParaRPr lang="en-US"/>
           </a:p>
@@ -2964,7 +3056,7 @@
           <a:p>
             <a:fld id="{7422A1A9-51FA-DF41-A07C-1B00F3E35F0E}" type="datetime3">
               <a:rPr lang="en-US" smtClean="0"/>
-              <a:t>27 February 2017</a:t>
+              <a:t>2 August 2017</a:t>
             </a:fld>
             <a:endParaRPr lang="en-US"/>
           </a:p>
@@ -3275,7 +3367,7 @@
           <a:p>
             <a:fld id="{1BAA28D7-13F9-A34F-873B-EBA7B3A86DEF}" type="datetime3">
               <a:rPr lang="en-US" smtClean="0"/>
-              <a:t>27 February 2017</a:t>
+              <a:t>2 August 2017</a:t>
             </a:fld>
             <a:endParaRPr lang="en-US"/>
           </a:p>
@@ -3566,7 +3658,7 @@
           <a:p>
             <a:fld id="{94BD2AFA-DC0F-F240-80F4-483BA0C3F0F5}" type="datetime3">
               <a:rPr lang="en-US" smtClean="0"/>
-              <a:t>27 February 2017</a:t>
+              <a:t>2 August 2017</a:t>
             </a:fld>
             <a:endParaRPr lang="en-US"/>
           </a:p>
@@ -3998,7 +4090,7 @@
           <a:p>
             <a:fld id="{55539DC5-26C3-024B-B9E6-1FF2B675A945}" type="datetime3">
               <a:rPr lang="en-US" smtClean="0"/>
-              <a:t>27 February 2017</a:t>
+              <a:t>2 August 2017</a:t>
             </a:fld>
             <a:endParaRPr lang="en-US" dirty="0"/>
           </a:p>
@@ -4331,8 +4423,8 @@
   <p:clrMap bg1="lt1" tx1="dk1" bg2="lt2" tx2="dk2" accent1="accent1" accent2="accent2" accent3="accent3" accent4="accent4" accent5="accent5" accent6="accent6" hlink="hlink" folHlink="folHlink"/>
   <p:sldLayoutIdLst>
     <p:sldLayoutId id="2147483661" r:id="rId1"/>
-    <p:sldLayoutId id="2147483662" r:id="rId2"/>
-    <p:sldLayoutId id="2147483663" r:id="rId3"/>
+    <p:sldLayoutId id="2147483663" r:id="rId2"/>
+    <p:sldLayoutId id="2147483662" r:id="rId3"/>
     <p:sldLayoutId id="2147483664" r:id="rId4"/>
     <p:sldLayoutId id="2147483665" r:id="rId5"/>
     <p:sldLayoutId id="2147483666" r:id="rId6"/>
@@ -4692,7 +4784,15 @@
           <a:p>
             <a:r>
               <a:rPr lang="en-US" dirty="0" smtClean="0"/>
-              <a:t>MELHOR TITULO DE UMA TESE DE SEMPRE ATÉ PODEM SER DUAS LINHAS</a:t>
+              <a:t>MELHOR TITULO DE UMA TESE DE </a:t>
+            </a:r>
+            <a:r>
+              <a:rPr lang="en-US" dirty="0" smtClean="0"/>
+              <a:t>SEMPRE, </a:t>
+            </a:r>
+            <a:r>
+              <a:rPr lang="en-US" dirty="0" smtClean="0"/>
+              <a:t>ATÉ PODEM SER DUAS LINHAS</a:t>
             </a:r>
             <a:endParaRPr lang="en-US" dirty="0"/>
           </a:p>
@@ -4717,7 +4817,11 @@
           <a:p>
             <a:r>
               <a:rPr lang="pt-PT" dirty="0"/>
-              <a:t>MESTRADO INTEGRADO EM ENGENHARIA INFORMÁTICA</a:t>
+              <a:t>MESTRADO INTEGRADO EM ENGENHARIA </a:t>
+            </a:r>
+            <a:r>
+              <a:rPr lang="pt-PT" dirty="0" smtClean="0"/>
+              <a:t>INFORMÁTICA</a:t>
             </a:r>
             <a:endParaRPr lang="en-US" dirty="0"/>
           </a:p>
@@ -4926,9 +5030,9 @@
           <a:p>
             <a:fld id="{1D0D4A2B-BFEE-FA4F-8A56-32A2EE6A0425}" type="datetime3">
               <a:rPr lang="en-US" smtClean="0"/>
-              <a:t>27 February 2017</a:t>
+              <a:t>2 August 2017</a:t>
             </a:fld>
-            <a:endParaRPr lang="en-US"/>
+            <a:endParaRPr lang="en-US" dirty="0"/>
           </a:p>
         </p:txBody>
       </p:sp>
@@ -4983,6 +5087,32 @@
               <a:t>2</a:t>
             </a:fld>
             <a:endParaRPr lang="en-US"/>
+          </a:p>
+        </p:txBody>
+      </p:sp>
+      <p:sp>
+        <p:nvSpPr>
+          <p:cNvPr id="7" name="TextBox 6"/>
+          <p:cNvSpPr txBox="1"/>
+          <p:nvPr/>
+        </p:nvSpPr>
+        <p:spPr>
+          <a:xfrm>
+            <a:off x="1650380" y="6634976"/>
+            <a:ext cx="184731" cy="369332"/>
+          </a:xfrm>
+          <a:prstGeom prst="rect">
+            <a:avLst/>
+          </a:prstGeom>
+          <a:noFill/>
+        </p:spPr>
+        <p:txBody>
+          <a:bodyPr wrap="none" rtlCol="0">
+            <a:spAutoFit/>
+          </a:bodyPr>
+          <a:lstStyle/>
+          <a:p>
+            <a:endParaRPr lang="en-US" dirty="0"/>
           </a:p>
         </p:txBody>
       </p:sp>
@@ -5115,7 +5245,7 @@
           <a:p>
             <a:fld id="{7422A1A9-51FA-DF41-A07C-1B00F3E35F0E}" type="datetime3">
               <a:rPr lang="en-US" smtClean="0"/>
-              <a:t>27 February 2017</a:t>
+              <a:t>2 August 2017</a:t>
             </a:fld>
             <a:endParaRPr lang="en-US"/>
           </a:p>

</xml_diff>